<commit_message>
Ajout box-shadow & border-radius à la map
</commit_message>
<xml_diff>
--- a/Ressources/Présentation Projet/Vélodyssée.pptx
+++ b/Ressources/Présentation Projet/Vélodyssée.pptx
@@ -19,6 +19,7 @@
     <p:sldId id="271" r:id="rId13"/>
     <p:sldId id="280" r:id="rId14"/>
     <p:sldId id="281" r:id="rId15"/>
+    <p:sldId id="282" r:id="rId16"/>
   </p:sldIdLst>
   <p:sldSz cx="12192000" cy="6858000"/>
   <p:notesSz cx="6858000" cy="9144000"/>
@@ -4429,11 +4430,7 @@
             </a:pPr>
             <a:r>
               <a:rPr lang="fr-FR" sz="2000" dirty="0"/>
-              <a:t>Utilisation </a:t>
-            </a:r>
-            <a:r>
-              <a:rPr lang="fr-FR" sz="2000" dirty="0"/>
-              <a:t>de </a:t>
+              <a:t>Utilisation de </a:t>
             </a:r>
             <a:r>
               <a:rPr lang="fr-FR" sz="2000" dirty="0" smtClean="0"/>
@@ -4441,15 +4438,7 @@
             </a:r>
             <a:r>
               <a:rPr lang="fr-FR" sz="2000" dirty="0"/>
-              <a:t>pour </a:t>
-            </a:r>
-            <a:r>
-              <a:rPr lang="fr-FR" sz="2000" dirty="0"/>
-              <a:t>la gestions des éléments </a:t>
-            </a:r>
-            <a:r>
-              <a:rPr lang="fr-FR" sz="2000" dirty="0"/>
-              <a:t>côté </a:t>
+              <a:t>pour la gestions des éléments côté </a:t>
             </a:r>
             <a:r>
               <a:rPr lang="fr-FR" sz="2000" dirty="0" smtClean="0"/>
@@ -4919,6 +4908,78 @@
 </p:sld>
 </file>
 
+<file path=ppt/slides/slide15.xml><?xml version="1.0" encoding="utf-8"?>
+<p:sld xmlns:a="http://schemas.openxmlformats.org/drawingml/2006/main" xmlns:r="http://schemas.openxmlformats.org/officeDocument/2006/relationships" xmlns:p="http://schemas.openxmlformats.org/presentationml/2006/main">
+  <p:cSld>
+    <p:spTree>
+      <p:nvGrpSpPr>
+        <p:cNvPr id="1" name=""/>
+        <p:cNvGrpSpPr/>
+        <p:nvPr/>
+      </p:nvGrpSpPr>
+      <p:grpSpPr>
+        <a:xfrm>
+          <a:off x="0" y="0"/>
+          <a:ext cx="0" cy="0"/>
+          <a:chOff x="0" y="0"/>
+          <a:chExt cx="0" cy="0"/>
+        </a:xfrm>
+      </p:grpSpPr>
+      <p:sp>
+        <p:nvSpPr>
+          <p:cNvPr id="2" name="Titre 1"/>
+          <p:cNvSpPr>
+            <a:spLocks noGrp="1"/>
+          </p:cNvSpPr>
+          <p:nvPr>
+            <p:ph type="title"/>
+          </p:nvPr>
+        </p:nvSpPr>
+        <p:spPr/>
+        <p:txBody>
+          <a:bodyPr/>
+          <a:lstStyle/>
+          <a:p>
+            <a:r>
+              <a:rPr lang="fr-FR" dirty="0" smtClean="0"/>
+              <a:t>WHAT ? WHY ? WHO ? HOW ?</a:t>
+            </a:r>
+            <a:endParaRPr lang="fr-FR" dirty="0"/>
+          </a:p>
+        </p:txBody>
+      </p:sp>
+      <p:sp>
+        <p:nvSpPr>
+          <p:cNvPr id="3" name="Espace réservé du texte 2"/>
+          <p:cNvSpPr>
+            <a:spLocks noGrp="1"/>
+          </p:cNvSpPr>
+          <p:nvPr>
+            <p:ph type="body" idx="1"/>
+          </p:nvPr>
+        </p:nvSpPr>
+        <p:spPr/>
+        <p:txBody>
+          <a:bodyPr/>
+          <a:lstStyle/>
+          <a:p>
+            <a:endParaRPr lang="fr-FR" dirty="0"/>
+          </a:p>
+        </p:txBody>
+      </p:sp>
+    </p:spTree>
+    <p:extLst>
+      <p:ext uri="{BB962C8B-B14F-4D97-AF65-F5344CB8AC3E}">
+        <p14:creationId xmlns:p14="http://schemas.microsoft.com/office/powerpoint/2010/main" val="3436313939"/>
+      </p:ext>
+    </p:extLst>
+  </p:cSld>
+  <p:clrMapOvr>
+    <a:masterClrMapping/>
+  </p:clrMapOvr>
+</p:sld>
+</file>
+
 <file path=ppt/slides/slide2.xml><?xml version="1.0" encoding="utf-8"?>
 <p:sld xmlns:a="http://schemas.openxmlformats.org/drawingml/2006/main" xmlns:r="http://schemas.openxmlformats.org/officeDocument/2006/relationships" xmlns:p="http://schemas.openxmlformats.org/presentationml/2006/main">
   <p:cSld>
@@ -5213,11 +5274,7 @@
           <a:p>
             <a:r>
               <a:rPr lang="fr-FR" dirty="0" smtClean="0"/>
-              <a:t>Présentation </a:t>
-            </a:r>
-            <a:r>
-              <a:rPr lang="fr-FR" dirty="0" smtClean="0"/>
-              <a:t>de </a:t>
+              <a:t>Présentation de </a:t>
             </a:r>
             <a:r>
               <a:rPr lang="fr-FR" dirty="0" err="1" smtClean="0"/>
@@ -5852,11 +5909,7 @@
             </a:r>
             <a:r>
               <a:rPr lang="fr-FR" sz="2600" dirty="0" smtClean="0"/>
-              <a:t>API </a:t>
-            </a:r>
-            <a:r>
-              <a:rPr lang="fr-FR" sz="2600" dirty="0" smtClean="0"/>
-              <a:t>REST</a:t>
+              <a:t>API REST</a:t>
             </a:r>
             <a:endParaRPr lang="fr-FR" sz="2600" dirty="0"/>
           </a:p>

</xml_diff>

<commit_message>
MàJ ressources avec Véloharbon au lieu de Vélodyssée
</commit_message>
<xml_diff>
--- a/Ressources/Présentation Projet/Vélodyssée.pptx
+++ b/Ressources/Présentation Projet/Vélodyssée.pptx
@@ -3385,8 +3385,8 @@
           <a:lstStyle/>
           <a:p>
             <a:r>
-              <a:rPr lang="fr-FR" b="1" dirty="0" smtClean="0"/>
-              <a:t>Vélodyssée</a:t>
+              <a:rPr lang="fr-FR" b="1" dirty="0" err="1" smtClean="0"/>
+              <a:t>vélocharbon</a:t>
             </a:r>
             <a:endParaRPr lang="fr-FR" b="1" dirty="0"/>
           </a:p>
@@ -3468,11 +3468,11 @@
   <p:clrMapOvr>
     <a:masterClrMapping/>
   </p:clrMapOvr>
-  <mc:AlternateContent xmlns:mc="http://schemas.openxmlformats.org/markup-compatibility/2006">
-    <mc:Choice xmlns:p14="http://schemas.microsoft.com/office/powerpoint/2010/main" Requires="p14">
+  <mc:AlternateContent xmlns:mc="http://schemas.openxmlformats.org/markup-compatibility/2006" xmlns:p14="http://schemas.microsoft.com/office/powerpoint/2010/main">
+    <mc:Choice Requires="p14">
       <p:transition spd="slow" p14:dur="2000"/>
     </mc:Choice>
-    <mc:Fallback>
+    <mc:Fallback xmlns="">
       <p:transition spd="slow"/>
     </mc:Fallback>
   </mc:AlternateContent>
@@ -5747,11 +5747,7 @@
             </a:pPr>
             <a:r>
               <a:rPr lang="fr-FR" sz="2800" dirty="0" smtClean="0"/>
-              <a:t>Résultat </a:t>
-            </a:r>
-            <a:r>
-              <a:rPr lang="fr-FR" sz="2800" dirty="0" smtClean="0"/>
-              <a:t>final</a:t>
+              <a:t>Résultat final</a:t>
             </a:r>
           </a:p>
           <a:p>
@@ -5766,7 +5762,6 @@
               <a:rPr lang="fr-FR" sz="2800" dirty="0" smtClean="0"/>
               <a:t>Intégration de données</a:t>
             </a:r>
-            <a:endParaRPr lang="fr-FR" sz="2800" dirty="0" smtClean="0"/>
           </a:p>
           <a:p>
             <a:pPr marL="457200" indent="-457200" algn="l">
@@ -5839,11 +5834,11 @@
   <p:clrMapOvr>
     <a:masterClrMapping/>
   </p:clrMapOvr>
-  <mc:AlternateContent xmlns:mc="http://schemas.openxmlformats.org/markup-compatibility/2006">
-    <mc:Choice xmlns:p14="http://schemas.microsoft.com/office/powerpoint/2010/main" Requires="p14">
+  <mc:AlternateContent xmlns:mc="http://schemas.openxmlformats.org/markup-compatibility/2006" xmlns:p14="http://schemas.microsoft.com/office/powerpoint/2010/main">
+    <mc:Choice Requires="p14">
       <p:transition spd="slow" p14:dur="2000"/>
     </mc:Choice>
-    <mc:Fallback>
+    <mc:Fallback xmlns="">
       <p:transition spd="slow"/>
     </mc:Fallback>
   </mc:AlternateContent>
@@ -5970,7 +5965,11 @@
           <a:p>
             <a:r>
               <a:rPr lang="fr-FR" dirty="0" smtClean="0"/>
-              <a:t>Présentation de vélodyssée</a:t>
+              <a:t>Présentation de </a:t>
+            </a:r>
+            <a:r>
+              <a:rPr lang="fr-FR" dirty="0" err="1" smtClean="0"/>
+              <a:t>véloCharbon</a:t>
             </a:r>
             <a:endParaRPr lang="fr-FR" dirty="0"/>
           </a:p>
@@ -6100,8 +6099,8 @@
         </p:blipFill>
         <p:spPr>
           <a:xfrm>
-            <a:off x="8849943" y="4719332"/>
-            <a:ext cx="2404211" cy="1190897"/>
+            <a:off x="9456600" y="4719332"/>
+            <a:ext cx="1892191" cy="1892191"/>
           </a:xfrm>
           <a:prstGeom prst="rect">
             <a:avLst/>
@@ -6118,11 +6117,11 @@
   <p:clrMapOvr>
     <a:masterClrMapping/>
   </p:clrMapOvr>
-  <mc:AlternateContent xmlns:mc="http://schemas.openxmlformats.org/markup-compatibility/2006">
-    <mc:Choice xmlns:p14="http://schemas.microsoft.com/office/powerpoint/2010/main" Requires="p14">
+  <mc:AlternateContent xmlns:mc="http://schemas.openxmlformats.org/markup-compatibility/2006" xmlns:p14="http://schemas.microsoft.com/office/powerpoint/2010/main">
+    <mc:Choice Requires="p14">
       <p:transition spd="slow" p14:dur="2000"/>
     </mc:Choice>
-    <mc:Fallback>
+    <mc:Fallback xmlns="">
       <p:transition spd="slow"/>
     </mc:Fallback>
   </mc:AlternateContent>
@@ -7571,15 +7570,7 @@
             </a:pPr>
             <a:r>
               <a:rPr lang="fr-FR" sz="2400" dirty="0" smtClean="0"/>
-              <a:t>Dispositions </a:t>
-            </a:r>
-            <a:r>
-              <a:rPr lang="fr-FR" sz="2400" dirty="0" smtClean="0"/>
-              <a:t>des éléments similaires aux autres </a:t>
-            </a:r>
-            <a:r>
-              <a:rPr lang="fr-FR" sz="2400" dirty="0" smtClean="0"/>
-              <a:t>sites</a:t>
+              <a:t>Dispositions des éléments similaires aux autres sites</a:t>
             </a:r>
           </a:p>
           <a:p>
@@ -7598,7 +7589,6 @@
               <a:rPr lang="fr-FR" sz="2400" dirty="0" smtClean="0"/>
               <a:t>Utilisation de logos propre à Vélodyssée</a:t>
             </a:r>
-            <a:endParaRPr lang="fr-FR" sz="2400" dirty="0" smtClean="0"/>
           </a:p>
           <a:p>
             <a:pPr algn="ctr"/>

</xml_diff>